<commit_message>
updated slides for lec 28 to 31 (logic families)
</commit_message>
<xml_diff>
--- a/Lec-28-29.pptx
+++ b/Lec-28-29.pptx
@@ -313,7 +313,7 @@
               <a:pPr>
                 <a:defRPr/>
               </a:pPr>
-              <a:t>10/27/2025</a:t>
+              <a:t>10/29/2025</a:t>
             </a:fld>
             <a:endParaRPr lang="en-US"/>
           </a:p>
@@ -12205,7 +12205,7 @@
                                           </p:stCondLst>
                                         </p:cTn>
                                         <p:tgtEl>
-                                          <p:spTgt spid="5"/>
+                                          <p:spTgt spid="4"/>
                                         </p:tgtEl>
                                         <p:attrNameLst>
                                           <p:attrName>style.visibility</p:attrName>
@@ -12414,6 +12414,152 @@
           </a:prstGeom>
         </p:spPr>
       </p:pic>
+      <p:pic>
+        <p:nvPicPr>
+          <p:cNvPr id="6" name="Picture 2">
+            <a:extLst>
+              <a:ext uri="{FF2B5EF4-FFF2-40B4-BE49-F238E27FC236}">
+                <a16:creationId xmlns:a16="http://schemas.microsoft.com/office/drawing/2014/main" id="{6E37D633-C209-47CA-9DA7-F484F3F0F993}"/>
+              </a:ext>
+            </a:extLst>
+          </p:cNvPr>
+          <p:cNvPicPr>
+            <a:picLocks noChangeAspect="1" noChangeArrowheads="1"/>
+          </p:cNvPicPr>
+          <p:nvPr/>
+        </p:nvPicPr>
+        <p:blipFill>
+          <a:blip r:embed="rId4">
+            <a:extLst>
+              <a:ext uri="{28A0092B-C50C-407E-A947-70E740481C1C}">
+                <a14:useLocalDpi xmlns:a14="http://schemas.microsoft.com/office/drawing/2010/main" val="0"/>
+              </a:ext>
+            </a:extLst>
+          </a:blip>
+          <a:srcRect/>
+          <a:stretch>
+            <a:fillRect/>
+          </a:stretch>
+        </p:blipFill>
+        <p:spPr bwMode="auto">
+          <a:xfrm>
+            <a:off x="217394" y="3032092"/>
+            <a:ext cx="2986439" cy="3251693"/>
+          </a:xfrm>
+          <a:prstGeom prst="rect">
+            <a:avLst/>
+          </a:prstGeom>
+          <a:noFill/>
+          <a:ln>
+            <a:noFill/>
+          </a:ln>
+          <a:extLst>
+            <a:ext uri="{909E8E84-426E-40DD-AFC4-6F175D3DCCD1}">
+              <a14:hiddenFill xmlns:a14="http://schemas.microsoft.com/office/drawing/2010/main">
+                <a:solidFill>
+                  <a:srgbClr val="FFFFFF"/>
+                </a:solidFill>
+              </a14:hiddenFill>
+            </a:ext>
+            <a:ext uri="{91240B29-F687-4F45-9708-019B960494DF}">
+              <a14:hiddenLine xmlns:a14="http://schemas.microsoft.com/office/drawing/2010/main" w="9525">
+                <a:solidFill>
+                  <a:srgbClr val="000000"/>
+                </a:solidFill>
+                <a:miter lim="800000"/>
+                <a:headEnd/>
+                <a:tailEnd/>
+              </a14:hiddenLine>
+            </a:ext>
+          </a:extLst>
+        </p:spPr>
+      </p:pic>
+      <p:cxnSp>
+        <p:nvCxnSpPr>
+          <p:cNvPr id="8" name="Straight Connector 7">
+            <a:extLst>
+              <a:ext uri="{FF2B5EF4-FFF2-40B4-BE49-F238E27FC236}">
+                <a16:creationId xmlns:a16="http://schemas.microsoft.com/office/drawing/2014/main" id="{0847403F-A901-442E-9099-9F56A7324360}"/>
+              </a:ext>
+            </a:extLst>
+          </p:cNvPr>
+          <p:cNvCxnSpPr>
+            <a:cxnSpLocks/>
+          </p:cNvCxnSpPr>
+          <p:nvPr/>
+        </p:nvCxnSpPr>
+        <p:spPr>
+          <a:xfrm>
+            <a:off x="6065520" y="4114800"/>
+            <a:ext cx="0" cy="889000"/>
+          </a:xfrm>
+          <a:prstGeom prst="line">
+            <a:avLst/>
+          </a:prstGeom>
+          <a:ln w="28575">
+            <a:solidFill>
+              <a:srgbClr val="FF0000"/>
+            </a:solidFill>
+          </a:ln>
+        </p:spPr>
+        <p:style>
+          <a:lnRef idx="1">
+            <a:schemeClr val="accent6"/>
+          </a:lnRef>
+          <a:fillRef idx="0">
+            <a:schemeClr val="accent6"/>
+          </a:fillRef>
+          <a:effectRef idx="0">
+            <a:schemeClr val="accent6"/>
+          </a:effectRef>
+          <a:fontRef idx="minor">
+            <a:schemeClr val="tx1"/>
+          </a:fontRef>
+        </p:style>
+      </p:cxnSp>
+      <p:cxnSp>
+        <p:nvCxnSpPr>
+          <p:cNvPr id="11" name="Straight Connector 10">
+            <a:extLst>
+              <a:ext uri="{FF2B5EF4-FFF2-40B4-BE49-F238E27FC236}">
+                <a16:creationId xmlns:a16="http://schemas.microsoft.com/office/drawing/2014/main" id="{DDF0C1C0-E050-4D28-8514-5F84E59F220F}"/>
+              </a:ext>
+            </a:extLst>
+          </p:cNvPr>
+          <p:cNvCxnSpPr>
+            <a:cxnSpLocks/>
+          </p:cNvCxnSpPr>
+          <p:nvPr/>
+        </p:nvCxnSpPr>
+        <p:spPr>
+          <a:xfrm flipH="1">
+            <a:off x="3962400" y="5003800"/>
+            <a:ext cx="2098040" cy="0"/>
+          </a:xfrm>
+          <a:prstGeom prst="line">
+            <a:avLst/>
+          </a:prstGeom>
+          <a:ln w="28575">
+            <a:solidFill>
+              <a:srgbClr val="FF0000"/>
+            </a:solidFill>
+          </a:ln>
+        </p:spPr>
+        <p:style>
+          <a:lnRef idx="1">
+            <a:schemeClr val="accent6"/>
+          </a:lnRef>
+          <a:fillRef idx="0">
+            <a:schemeClr val="accent6"/>
+          </a:fillRef>
+          <a:effectRef idx="0">
+            <a:schemeClr val="accent6"/>
+          </a:effectRef>
+          <a:fontRef idx="minor">
+            <a:schemeClr val="tx1"/>
+          </a:fontRef>
+        </p:style>
+      </p:cxnSp>
     </p:spTree>
     <p:extLst>
       <p:ext uri="{BB962C8B-B14F-4D97-AF65-F5344CB8AC3E}">
@@ -12552,7 +12698,124 @@
                                           </p:stCondLst>
                                         </p:cTn>
                                         <p:tgtEl>
+                                          <p:spTgt spid="6"/>
+                                        </p:tgtEl>
+                                        <p:attrNameLst>
+                                          <p:attrName>style.visibility</p:attrName>
+                                        </p:attrNameLst>
+                                      </p:cBhvr>
+                                      <p:to>
+                                        <p:strVal val="visible"/>
+                                      </p:to>
+                                    </p:set>
+                                  </p:childTnLst>
+                                </p:cTn>
+                              </p:par>
+                            </p:childTnLst>
+                          </p:cTn>
+                        </p:par>
+                      </p:childTnLst>
+                    </p:cTn>
+                  </p:par>
+                  <p:par>
+                    <p:cTn id="15" fill="hold">
+                      <p:stCondLst>
+                        <p:cond delay="indefinite"/>
+                      </p:stCondLst>
+                      <p:childTnLst>
+                        <p:par>
+                          <p:cTn id="16" fill="hold">
+                            <p:stCondLst>
+                              <p:cond delay="0"/>
+                            </p:stCondLst>
+                            <p:childTnLst>
+                              <p:par>
+                                <p:cTn id="17" presetID="1" presetClass="entr" presetSubtype="0" fill="hold" nodeType="clickEffect">
+                                  <p:stCondLst>
+                                    <p:cond delay="0"/>
+                                  </p:stCondLst>
+                                  <p:childTnLst>
+                                    <p:set>
+                                      <p:cBhvr>
+                                        <p:cTn id="18" dur="1" fill="hold">
+                                          <p:stCondLst>
+                                            <p:cond delay="0"/>
+                                          </p:stCondLst>
+                                        </p:cTn>
+                                        <p:tgtEl>
                                           <p:spTgt spid="7"/>
+                                        </p:tgtEl>
+                                        <p:attrNameLst>
+                                          <p:attrName>style.visibility</p:attrName>
+                                        </p:attrNameLst>
+                                      </p:cBhvr>
+                                      <p:to>
+                                        <p:strVal val="visible"/>
+                                      </p:to>
+                                    </p:set>
+                                  </p:childTnLst>
+                                </p:cTn>
+                              </p:par>
+                            </p:childTnLst>
+                          </p:cTn>
+                        </p:par>
+                      </p:childTnLst>
+                    </p:cTn>
+                  </p:par>
+                  <p:par>
+                    <p:cTn id="19" fill="hold">
+                      <p:stCondLst>
+                        <p:cond delay="indefinite"/>
+                      </p:stCondLst>
+                      <p:childTnLst>
+                        <p:par>
+                          <p:cTn id="20" fill="hold">
+                            <p:stCondLst>
+                              <p:cond delay="0"/>
+                            </p:stCondLst>
+                            <p:childTnLst>
+                              <p:par>
+                                <p:cTn id="21" presetID="1" presetClass="entr" presetSubtype="0" fill="hold" nodeType="clickEffect">
+                                  <p:stCondLst>
+                                    <p:cond delay="0"/>
+                                  </p:stCondLst>
+                                  <p:childTnLst>
+                                    <p:set>
+                                      <p:cBhvr>
+                                        <p:cTn id="22" dur="1" fill="hold">
+                                          <p:stCondLst>
+                                            <p:cond delay="0"/>
+                                          </p:stCondLst>
+                                        </p:cTn>
+                                        <p:tgtEl>
+                                          <p:spTgt spid="8"/>
+                                        </p:tgtEl>
+                                        <p:attrNameLst>
+                                          <p:attrName>style.visibility</p:attrName>
+                                        </p:attrNameLst>
+                                      </p:cBhvr>
+                                      <p:to>
+                                        <p:strVal val="visible"/>
+                                      </p:to>
+                                    </p:set>
+                                  </p:childTnLst>
+                                </p:cTn>
+                              </p:par>
+                              <p:par>
+                                <p:cTn id="23" presetID="1" presetClass="entr" presetSubtype="0" fill="hold" nodeType="withEffect">
+                                  <p:stCondLst>
+                                    <p:cond delay="0"/>
+                                  </p:stCondLst>
+                                  <p:childTnLst>
+                                    <p:set>
+                                      <p:cBhvr>
+                                        <p:cTn id="24" dur="1" fill="hold">
+                                          <p:stCondLst>
+                                            <p:cond delay="0"/>
+                                          </p:stCondLst>
+                                        </p:cTn>
+                                        <p:tgtEl>
+                                          <p:spTgt spid="11"/>
                                         </p:tgtEl>
                                         <p:attrNameLst>
                                           <p:attrName>style.visibility</p:attrName>

</xml_diff>